<commit_message>
add excute, findpeak and check outside direction functions
</commit_message>
<xml_diff>
--- a/result display.pptx
+++ b/result display.pptx
@@ -7,6 +7,7 @@
   <p:sldIdLst>
     <p:sldId id="256" r:id="rId2"/>
     <p:sldId id="257" r:id="rId3"/>
+    <p:sldId id="258" r:id="rId4"/>
   </p:sldIdLst>
   <p:sldSz cx="9144000" cy="6858000" type="screen4x3"/>
   <p:notesSz cx="6858000" cy="9144000"/>
@@ -3324,6 +3325,192 @@
     <p:extLst>
       <p:ext uri="{BB962C8B-B14F-4D97-AF65-F5344CB8AC3E}">
         <p14:creationId xmlns:p14="http://schemas.microsoft.com/office/powerpoint/2010/main" val="401926168"/>
+      </p:ext>
+    </p:extLst>
+  </p:cSld>
+  <p:clrMapOvr>
+    <a:masterClrMapping/>
+  </p:clrMapOvr>
+</p:sld>
+</file>
+
+<file path=ppt/slides/slide3.xml><?xml version="1.0" encoding="utf-8"?>
+<p:sld xmlns:a="http://schemas.openxmlformats.org/drawingml/2006/main" xmlns:r="http://schemas.openxmlformats.org/officeDocument/2006/relationships" xmlns:p="http://schemas.openxmlformats.org/presentationml/2006/main">
+  <p:cSld>
+    <p:spTree>
+      <p:nvGrpSpPr>
+        <p:cNvPr id="1" name=""/>
+        <p:cNvGrpSpPr/>
+        <p:nvPr/>
+      </p:nvGrpSpPr>
+      <p:grpSpPr>
+        <a:xfrm>
+          <a:off x="0" y="0"/>
+          <a:ext cx="0" cy="0"/>
+          <a:chOff x="0" y="0"/>
+          <a:chExt cx="0" cy="0"/>
+        </a:xfrm>
+      </p:grpSpPr>
+      <p:pic>
+        <p:nvPicPr>
+          <p:cNvPr id="4" name="图片 3"/>
+          <p:cNvPicPr>
+            <a:picLocks noChangeAspect="1"/>
+          </p:cNvPicPr>
+          <p:nvPr/>
+        </p:nvPicPr>
+        <p:blipFill>
+          <a:blip r:embed="rId2"/>
+          <a:stretch>
+            <a:fillRect/>
+          </a:stretch>
+        </p:blipFill>
+        <p:spPr>
+          <a:xfrm>
+            <a:off x="238132" y="0"/>
+            <a:ext cx="4117849" cy="3195509"/>
+          </a:xfrm>
+          <a:prstGeom prst="rect">
+            <a:avLst/>
+          </a:prstGeom>
+        </p:spPr>
+      </p:pic>
+      <p:sp>
+        <p:nvSpPr>
+          <p:cNvPr id="5" name="文本框 4"/>
+          <p:cNvSpPr txBox="1"/>
+          <p:nvPr/>
+        </p:nvSpPr>
+        <p:spPr>
+          <a:xfrm>
+            <a:off x="1417455" y="3195509"/>
+            <a:ext cx="1556135" cy="369332"/>
+          </a:xfrm>
+          <a:prstGeom prst="rect">
+            <a:avLst/>
+          </a:prstGeom>
+          <a:noFill/>
+        </p:spPr>
+        <p:txBody>
+          <a:bodyPr wrap="none" rtlCol="0">
+            <a:spAutoFit/>
+          </a:bodyPr>
+          <a:lstStyle/>
+          <a:p>
+            <a:r>
+              <a:rPr kumimoji="1" lang="en-US" altLang="zh-CN" dirty="0" err="1" smtClean="0"/>
+              <a:t>Single_outside</a:t>
+            </a:r>
+            <a:endParaRPr kumimoji="1" lang="zh-CN" altLang="en-US" dirty="0"/>
+          </a:p>
+        </p:txBody>
+      </p:sp>
+      <p:pic>
+        <p:nvPicPr>
+          <p:cNvPr id="6" name="图片 5"/>
+          <p:cNvPicPr>
+            <a:picLocks noChangeAspect="1"/>
+          </p:cNvPicPr>
+          <p:nvPr/>
+        </p:nvPicPr>
+        <p:blipFill>
+          <a:blip r:embed="rId3"/>
+          <a:stretch>
+            <a:fillRect/>
+          </a:stretch>
+        </p:blipFill>
+        <p:spPr>
+          <a:xfrm>
+            <a:off x="4575178" y="0"/>
+            <a:ext cx="3873509" cy="3132674"/>
+          </a:xfrm>
+          <a:prstGeom prst="rect">
+            <a:avLst/>
+          </a:prstGeom>
+        </p:spPr>
+      </p:pic>
+      <p:sp>
+        <p:nvSpPr>
+          <p:cNvPr id="7" name="文本框 6"/>
+          <p:cNvSpPr txBox="1"/>
+          <p:nvPr/>
+        </p:nvSpPr>
+        <p:spPr>
+          <a:xfrm>
+            <a:off x="5839914" y="3247315"/>
+            <a:ext cx="1347281" cy="369332"/>
+          </a:xfrm>
+          <a:prstGeom prst="rect">
+            <a:avLst/>
+          </a:prstGeom>
+          <a:noFill/>
+        </p:spPr>
+        <p:txBody>
+          <a:bodyPr wrap="none" rtlCol="0">
+            <a:spAutoFit/>
+          </a:bodyPr>
+          <a:lstStyle/>
+          <a:p>
+            <a:r>
+              <a:rPr kumimoji="1" lang="en-US" altLang="zh-CN" dirty="0" smtClean="0"/>
+              <a:t>Single inside</a:t>
+            </a:r>
+            <a:endParaRPr kumimoji="1" lang="zh-CN" altLang="en-US" dirty="0"/>
+          </a:p>
+        </p:txBody>
+      </p:sp>
+      <p:pic>
+        <p:nvPicPr>
+          <p:cNvPr id="9" name="图片 8"/>
+          <p:cNvPicPr>
+            <a:picLocks noChangeAspect="1"/>
+          </p:cNvPicPr>
+          <p:nvPr/>
+        </p:nvPicPr>
+        <p:blipFill>
+          <a:blip r:embed="rId4"/>
+          <a:stretch>
+            <a:fillRect/>
+          </a:stretch>
+        </p:blipFill>
+        <p:spPr>
+          <a:xfrm>
+            <a:off x="238133" y="3559419"/>
+            <a:ext cx="4119494" cy="3298581"/>
+          </a:xfrm>
+          <a:prstGeom prst="rect">
+            <a:avLst/>
+          </a:prstGeom>
+        </p:spPr>
+      </p:pic>
+      <p:pic>
+        <p:nvPicPr>
+          <p:cNvPr id="10" name="图片 9"/>
+          <p:cNvPicPr>
+            <a:picLocks noChangeAspect="1"/>
+          </p:cNvPicPr>
+          <p:nvPr/>
+        </p:nvPicPr>
+        <p:blipFill>
+          <a:blip r:embed="rId5"/>
+          <a:stretch>
+            <a:fillRect/>
+          </a:stretch>
+        </p:blipFill>
+        <p:spPr>
+          <a:xfrm>
+            <a:off x="4575178" y="3559419"/>
+            <a:ext cx="4214601" cy="3306153"/>
+          </a:xfrm>
+          <a:prstGeom prst="rect">
+            <a:avLst/>
+          </a:prstGeom>
+        </p:spPr>
+      </p:pic>
+    </p:spTree>
+    <p:extLst>
+      <p:ext uri="{BB962C8B-B14F-4D97-AF65-F5344CB8AC3E}">
+        <p14:creationId xmlns:p14="http://schemas.microsoft.com/office/powerpoint/2010/main" val="770783190"/>
       </p:ext>
     </p:extLst>
   </p:cSld>

</xml_diff>

<commit_message>
adjust find peak threshold value from 10 to 5
</commit_message>
<xml_diff>
--- a/result display.pptx
+++ b/result display.pptx
@@ -8,6 +8,7 @@
     <p:sldId id="256" r:id="rId2"/>
     <p:sldId id="257" r:id="rId3"/>
     <p:sldId id="258" r:id="rId4"/>
+    <p:sldId id="259" r:id="rId5"/>
   </p:sldIdLst>
   <p:sldSz cx="9144000" cy="6858000" type="screen4x3"/>
   <p:notesSz cx="6858000" cy="9144000"/>
@@ -3511,6 +3512,132 @@
     <p:extLst>
       <p:ext uri="{BB962C8B-B14F-4D97-AF65-F5344CB8AC3E}">
         <p14:creationId xmlns:p14="http://schemas.microsoft.com/office/powerpoint/2010/main" val="770783190"/>
+      </p:ext>
+    </p:extLst>
+  </p:cSld>
+  <p:clrMapOvr>
+    <a:masterClrMapping/>
+  </p:clrMapOvr>
+</p:sld>
+</file>
+
+<file path=ppt/slides/slide4.xml><?xml version="1.0" encoding="utf-8"?>
+<p:sld xmlns:a="http://schemas.openxmlformats.org/drawingml/2006/main" xmlns:r="http://schemas.openxmlformats.org/officeDocument/2006/relationships" xmlns:p="http://schemas.openxmlformats.org/presentationml/2006/main">
+  <p:cSld>
+    <p:spTree>
+      <p:nvGrpSpPr>
+        <p:cNvPr id="1" name=""/>
+        <p:cNvGrpSpPr/>
+        <p:nvPr/>
+      </p:nvGrpSpPr>
+      <p:grpSpPr>
+        <a:xfrm>
+          <a:off x="0" y="0"/>
+          <a:ext cx="0" cy="0"/>
+          <a:chOff x="0" y="0"/>
+          <a:chExt cx="0" cy="0"/>
+        </a:xfrm>
+      </p:grpSpPr>
+      <p:pic>
+        <p:nvPicPr>
+          <p:cNvPr id="4" name="图片 3"/>
+          <p:cNvPicPr>
+            <a:picLocks noChangeAspect="1"/>
+          </p:cNvPicPr>
+          <p:nvPr/>
+        </p:nvPicPr>
+        <p:blipFill>
+          <a:blip r:embed="rId2"/>
+          <a:stretch>
+            <a:fillRect/>
+          </a:stretch>
+        </p:blipFill>
+        <p:spPr>
+          <a:xfrm>
+            <a:off x="235209" y="115752"/>
+            <a:ext cx="4095152" cy="3188317"/>
+          </a:xfrm>
+          <a:prstGeom prst="rect">
+            <a:avLst/>
+          </a:prstGeom>
+        </p:spPr>
+      </p:pic>
+      <p:pic>
+        <p:nvPicPr>
+          <p:cNvPr id="5" name="图片 4"/>
+          <p:cNvPicPr>
+            <a:picLocks noChangeAspect="1"/>
+          </p:cNvPicPr>
+          <p:nvPr/>
+        </p:nvPicPr>
+        <p:blipFill>
+          <a:blip r:embed="rId3"/>
+          <a:stretch>
+            <a:fillRect/>
+          </a:stretch>
+        </p:blipFill>
+        <p:spPr>
+          <a:xfrm>
+            <a:off x="4637499" y="115752"/>
+            <a:ext cx="4085032" cy="3188317"/>
+          </a:xfrm>
+          <a:prstGeom prst="rect">
+            <a:avLst/>
+          </a:prstGeom>
+        </p:spPr>
+      </p:pic>
+      <p:pic>
+        <p:nvPicPr>
+          <p:cNvPr id="6" name="图片 5"/>
+          <p:cNvPicPr>
+            <a:picLocks noChangeAspect="1"/>
+          </p:cNvPicPr>
+          <p:nvPr/>
+        </p:nvPicPr>
+        <p:blipFill>
+          <a:blip r:embed="rId4"/>
+          <a:stretch>
+            <a:fillRect/>
+          </a:stretch>
+        </p:blipFill>
+        <p:spPr>
+          <a:xfrm>
+            <a:off x="235695" y="3445166"/>
+            <a:ext cx="4094666" cy="3236459"/>
+          </a:xfrm>
+          <a:prstGeom prst="rect">
+            <a:avLst/>
+          </a:prstGeom>
+        </p:spPr>
+      </p:pic>
+      <p:pic>
+        <p:nvPicPr>
+          <p:cNvPr id="7" name="图片 6"/>
+          <p:cNvPicPr>
+            <a:picLocks noChangeAspect="1"/>
+          </p:cNvPicPr>
+          <p:nvPr/>
+        </p:nvPicPr>
+        <p:blipFill>
+          <a:blip r:embed="rId5"/>
+          <a:stretch>
+            <a:fillRect/>
+          </a:stretch>
+        </p:blipFill>
+        <p:spPr>
+          <a:xfrm>
+            <a:off x="4637499" y="3445166"/>
+            <a:ext cx="3970002" cy="3229223"/>
+          </a:xfrm>
+          <a:prstGeom prst="rect">
+            <a:avLst/>
+          </a:prstGeom>
+        </p:spPr>
+      </p:pic>
+    </p:spTree>
+    <p:extLst>
+      <p:ext uri="{BB962C8B-B14F-4D97-AF65-F5344CB8AC3E}">
+        <p14:creationId xmlns:p14="http://schemas.microsoft.com/office/powerpoint/2010/main" val="778261108"/>
       </p:ext>
     </p:extLst>
   </p:cSld>

</xml_diff>